<commit_message>
add just eat test
</commit_message>
<xml_diff>
--- a/document/course2-3.pptx
+++ b/document/course2-3.pptx
@@ -5,7 +5,7 @@
     <p:sldMasterId id="2147483723" r:id="rId1"/>
   </p:sldMasterIdLst>
   <p:notesMasterIdLst>
-    <p:notesMasterId r:id="rId17"/>
+    <p:notesMasterId r:id="rId24"/>
   </p:notesMasterIdLst>
   <p:sldIdLst>
     <p:sldId id="286" r:id="rId2"/>
@@ -23,6 +23,13 @@
     <p:sldId id="297" r:id="rId14"/>
     <p:sldId id="299" r:id="rId15"/>
     <p:sldId id="300" r:id="rId16"/>
+    <p:sldId id="306" r:id="rId17"/>
+    <p:sldId id="303" r:id="rId18"/>
+    <p:sldId id="304" r:id="rId19"/>
+    <p:sldId id="307" r:id="rId20"/>
+    <p:sldId id="305" r:id="rId21"/>
+    <p:sldId id="309" r:id="rId22"/>
+    <p:sldId id="308" r:id="rId23"/>
   </p:sldIdLst>
   <p:sldSz cx="12192000" cy="6858000"/>
   <p:notesSz cx="6858000" cy="9144000"/>
@@ -144,6 +151,13 @@
             <p14:sldId id="297"/>
             <p14:sldId id="299"/>
             <p14:sldId id="300"/>
+            <p14:sldId id="306"/>
+            <p14:sldId id="303"/>
+            <p14:sldId id="304"/>
+            <p14:sldId id="307"/>
+            <p14:sldId id="305"/>
+            <p14:sldId id="309"/>
+            <p14:sldId id="308"/>
           </p14:sldIdLst>
         </p14:section>
       </p14:sectionLst>
@@ -237,7 +251,7 @@
           <a:p>
             <a:fld id="{90C9A26C-E32A-0842-B5B6-EF949C454305}" type="datetimeFigureOut">
               <a:rPr lang="en-US" smtClean="0"/>
-              <a:t>11/3/18</a:t>
+              <a:t>11/10/18</a:t>
             </a:fld>
             <a:endParaRPr lang="en-US"/>
           </a:p>
@@ -692,7 +706,7 @@
           <a:p>
             <a:fld id="{48A87A34-81AB-432B-8DAE-1953F412C126}" type="datetimeFigureOut">
               <a:rPr lang="en-US" smtClean="0"/>
-              <a:t>11/3/18</a:t>
+              <a:t>11/10/18</a:t>
             </a:fld>
             <a:endParaRPr lang="en-US" dirty="0"/>
           </a:p>
@@ -1026,7 +1040,7 @@
             <a:fld id="{48A87A34-81AB-432B-8DAE-1953F412C126}" type="datetimeFigureOut">
               <a:rPr lang="en-US" smtClean="0"/>
               <a:pPr/>
-              <a:t>11/3/18</a:t>
+              <a:t>11/10/18</a:t>
             </a:fld>
             <a:endParaRPr lang="en-US" dirty="0"/>
           </a:p>
@@ -1424,7 +1438,7 @@
             <a:fld id="{48A87A34-81AB-432B-8DAE-1953F412C126}" type="datetimeFigureOut">
               <a:rPr lang="en-US" smtClean="0"/>
               <a:pPr/>
-              <a:t>11/3/18</a:t>
+              <a:t>11/10/18</a:t>
             </a:fld>
             <a:endParaRPr lang="en-US" dirty="0"/>
           </a:p>
@@ -1757,7 +1771,7 @@
             <a:fld id="{48A87A34-81AB-432B-8DAE-1953F412C126}" type="datetimeFigureOut">
               <a:rPr lang="en-US" smtClean="0"/>
               <a:pPr/>
-              <a:t>11/3/18</a:t>
+              <a:t>11/10/18</a:t>
             </a:fld>
             <a:endParaRPr lang="en-US" dirty="0"/>
           </a:p>
@@ -2074,7 +2088,7 @@
             <a:fld id="{48A87A34-81AB-432B-8DAE-1953F412C126}" type="datetimeFigureOut">
               <a:rPr lang="en-US" smtClean="0"/>
               <a:pPr/>
-              <a:t>11/3/18</a:t>
+              <a:t>11/10/18</a:t>
             </a:fld>
             <a:endParaRPr lang="en-US" dirty="0"/>
           </a:p>
@@ -2467,7 +2481,7 @@
             <a:fld id="{48A87A34-81AB-432B-8DAE-1953F412C126}" type="datetimeFigureOut">
               <a:rPr lang="en-US" smtClean="0"/>
               <a:pPr/>
-              <a:t>11/3/18</a:t>
+              <a:t>11/10/18</a:t>
             </a:fld>
             <a:endParaRPr lang="en-US" dirty="0"/>
           </a:p>
@@ -2720,7 +2734,7 @@
           <a:p>
             <a:fld id="{48A87A34-81AB-432B-8DAE-1953F412C126}" type="datetimeFigureOut">
               <a:rPr lang="en-US" smtClean="0"/>
-              <a:t>11/3/18</a:t>
+              <a:t>11/10/18</a:t>
             </a:fld>
             <a:endParaRPr lang="en-US" dirty="0"/>
           </a:p>
@@ -2977,7 +2991,7 @@
           <a:p>
             <a:fld id="{48A87A34-81AB-432B-8DAE-1953F412C126}" type="datetimeFigureOut">
               <a:rPr lang="en-US" smtClean="0"/>
-              <a:t>11/3/18</a:t>
+              <a:t>11/10/18</a:t>
             </a:fld>
             <a:endParaRPr lang="en-US" dirty="0"/>
           </a:p>
@@ -3234,7 +3248,7 @@
           <a:p>
             <a:fld id="{48A87A34-81AB-432B-8DAE-1953F412C126}" type="datetimeFigureOut">
               <a:rPr lang="en-US" smtClean="0"/>
-              <a:t>11/3/18</a:t>
+              <a:t>11/10/18</a:t>
             </a:fld>
             <a:endParaRPr lang="en-US" dirty="0"/>
           </a:p>
@@ -3558,7 +3572,7 @@
           <a:p>
             <a:fld id="{48A87A34-81AB-432B-8DAE-1953F412C126}" type="datetimeFigureOut">
               <a:rPr lang="en-US" smtClean="0"/>
-              <a:t>11/3/18</a:t>
+              <a:t>11/10/18</a:t>
             </a:fld>
             <a:endParaRPr lang="en-US" dirty="0"/>
           </a:p>
@@ -3876,7 +3890,7 @@
           <a:p>
             <a:fld id="{48A87A34-81AB-432B-8DAE-1953F412C126}" type="datetimeFigureOut">
               <a:rPr lang="en-US" smtClean="0"/>
-              <a:t>11/3/18</a:t>
+              <a:t>11/10/18</a:t>
             </a:fld>
             <a:endParaRPr lang="en-US" dirty="0"/>
           </a:p>
@@ -4328,7 +4342,7 @@
           <a:p>
             <a:fld id="{48A87A34-81AB-432B-8DAE-1953F412C126}" type="datetimeFigureOut">
               <a:rPr lang="en-US" smtClean="0"/>
-              <a:t>11/3/18</a:t>
+              <a:t>11/10/18</a:t>
             </a:fld>
             <a:endParaRPr lang="en-US" dirty="0"/>
           </a:p>
@@ -4528,7 +4542,7 @@
           <a:p>
             <a:fld id="{48A87A34-81AB-432B-8DAE-1953F412C126}" type="datetimeFigureOut">
               <a:rPr lang="en-US" smtClean="0"/>
-              <a:t>11/3/18</a:t>
+              <a:t>11/10/18</a:t>
             </a:fld>
             <a:endParaRPr lang="en-US" dirty="0"/>
           </a:p>
@@ -4700,7 +4714,7 @@
           <a:p>
             <a:fld id="{48A87A34-81AB-432B-8DAE-1953F412C126}" type="datetimeFigureOut">
               <a:rPr lang="en-US" smtClean="0"/>
-              <a:t>11/3/18</a:t>
+              <a:t>11/10/18</a:t>
             </a:fld>
             <a:endParaRPr lang="en-US" dirty="0"/>
           </a:p>
@@ -5028,7 +5042,7 @@
           <a:p>
             <a:fld id="{48A87A34-81AB-432B-8DAE-1953F412C126}" type="datetimeFigureOut">
               <a:rPr lang="en-US" smtClean="0"/>
-              <a:t>11/3/18</a:t>
+              <a:t>11/10/18</a:t>
             </a:fld>
             <a:endParaRPr lang="en-US" dirty="0"/>
           </a:p>
@@ -5368,7 +5382,7 @@
           <a:p>
             <a:fld id="{48A87A34-81AB-432B-8DAE-1953F412C126}" type="datetimeFigureOut">
               <a:rPr lang="en-US" smtClean="0"/>
-              <a:t>11/3/18</a:t>
+              <a:t>11/10/18</a:t>
             </a:fld>
             <a:endParaRPr lang="en-US" dirty="0"/>
           </a:p>
@@ -7481,7 +7495,7 @@
             <a:fld id="{48A87A34-81AB-432B-8DAE-1953F412C126}" type="datetimeFigureOut">
               <a:rPr lang="en-US" smtClean="0"/>
               <a:pPr/>
-              <a:t>11/3/18</a:t>
+              <a:t>11/10/18</a:t>
             </a:fld>
             <a:endParaRPr lang="en-US" dirty="0"/>
           </a:p>
@@ -9593,225 +9607,355 @@
         </p:spPr>
         <p:txBody>
           <a:bodyPr>
-            <a:normAutofit fontScale="62500" lnSpcReduction="20000"/>
+            <a:noAutofit/>
           </a:bodyPr>
           <a:lstStyle/>
           <a:p>
             <a:pPr marL="0" indent="0">
+              <a:spcBef>
+                <a:spcPts val="0"/>
+              </a:spcBef>
               <a:buNone/>
             </a:pPr>
             <a:r>
-              <a:rPr lang="en-US" dirty="0"/>
+              <a:rPr lang="en-US" sz="1600" dirty="0">
+                <a:latin typeface="Calibri" panose="020F0502020204030204" pitchFamily="34" charset="0"/>
+                <a:cs typeface="Calibri" panose="020F0502020204030204" pitchFamily="34" charset="0"/>
+              </a:rPr>
               <a:t>class Person:</a:t>
             </a:r>
           </a:p>
           <a:p>
             <a:pPr marL="0" indent="0">
+              <a:spcBef>
+                <a:spcPts val="0"/>
+              </a:spcBef>
               <a:buNone/>
             </a:pPr>
             <a:r>
-              <a:rPr lang="en-US" dirty="0"/>
+              <a:rPr lang="en-US" sz="1600" dirty="0">
+                <a:latin typeface="Calibri" panose="020F0502020204030204" pitchFamily="34" charset="0"/>
+                <a:cs typeface="Calibri" panose="020F0502020204030204" pitchFamily="34" charset="0"/>
+              </a:rPr>
               <a:t>    __name= ""</a:t>
             </a:r>
           </a:p>
           <a:p>
             <a:pPr marL="0" indent="0">
+              <a:spcBef>
+                <a:spcPts val="0"/>
+              </a:spcBef>
               <a:buNone/>
             </a:pPr>
             <a:r>
-              <a:rPr lang="en-US" dirty="0"/>
+              <a:rPr lang="en-US" sz="1600" dirty="0">
+                <a:latin typeface="Calibri" panose="020F0502020204030204" pitchFamily="34" charset="0"/>
+                <a:cs typeface="Calibri" panose="020F0502020204030204" pitchFamily="34" charset="0"/>
+              </a:rPr>
               <a:t>    __age =0</a:t>
             </a:r>
           </a:p>
           <a:p>
             <a:pPr marL="0" indent="0">
+              <a:spcBef>
+                <a:spcPts val="0"/>
+              </a:spcBef>
               <a:buNone/>
             </a:pPr>
-            <a:endParaRPr lang="en-US" dirty="0"/>
+            <a:endParaRPr lang="en-US" sz="1600" dirty="0">
+              <a:latin typeface="Calibri" panose="020F0502020204030204" pitchFamily="34" charset="0"/>
+              <a:cs typeface="Calibri" panose="020F0502020204030204" pitchFamily="34" charset="0"/>
+            </a:endParaRPr>
           </a:p>
           <a:p>
             <a:pPr marL="0" indent="0">
+              <a:spcBef>
+                <a:spcPts val="0"/>
+              </a:spcBef>
               <a:buNone/>
             </a:pPr>
             <a:r>
-              <a:rPr lang="en-US" dirty="0"/>
-              <a:t>    </a:t>
-            </a:r>
-            <a:r>
-              <a:rPr lang="en-US" dirty="0" err="1"/>
-              <a:t>def</a:t>
-            </a:r>
-            <a:r>
-              <a:rPr lang="en-US" dirty="0"/>
-              <a:t> __</a:t>
-            </a:r>
-            <a:r>
-              <a:rPr lang="en-US" dirty="0" err="1"/>
+              <a:rPr lang="en-US" sz="1600" dirty="0">
+                <a:latin typeface="Calibri" panose="020F0502020204030204" pitchFamily="34" charset="0"/>
+                <a:cs typeface="Calibri" panose="020F0502020204030204" pitchFamily="34" charset="0"/>
+              </a:rPr>
+              <a:t>    def __</a:t>
+            </a:r>
+            <a:r>
+              <a:rPr lang="en-US" sz="1600" dirty="0" err="1">
+                <a:latin typeface="Calibri" panose="020F0502020204030204" pitchFamily="34" charset="0"/>
+                <a:cs typeface="Calibri" panose="020F0502020204030204" pitchFamily="34" charset="0"/>
+              </a:rPr>
               <a:t>init</a:t>
             </a:r>
             <a:r>
-              <a:rPr lang="en-US" dirty="0"/>
+              <a:rPr lang="en-US" sz="1600" dirty="0">
+                <a:latin typeface="Calibri" panose="020F0502020204030204" pitchFamily="34" charset="0"/>
+                <a:cs typeface="Calibri" panose="020F0502020204030204" pitchFamily="34" charset="0"/>
+              </a:rPr>
               <a:t>__(self, name):</a:t>
             </a:r>
           </a:p>
           <a:p>
             <a:pPr marL="0" indent="0">
+              <a:spcBef>
+                <a:spcPts val="0"/>
+              </a:spcBef>
               <a:buNone/>
             </a:pPr>
             <a:r>
-              <a:rPr lang="en-US" dirty="0"/>
+              <a:rPr lang="en-US" sz="1600" dirty="0">
+                <a:latin typeface="Calibri" panose="020F0502020204030204" pitchFamily="34" charset="0"/>
+                <a:cs typeface="Calibri" panose="020F0502020204030204" pitchFamily="34" charset="0"/>
+              </a:rPr>
               <a:t>        </a:t>
             </a:r>
             <a:r>
-              <a:rPr lang="en-US" dirty="0" err="1"/>
+              <a:rPr lang="en-US" sz="1600" dirty="0" err="1">
+                <a:latin typeface="Calibri" panose="020F0502020204030204" pitchFamily="34" charset="0"/>
+                <a:cs typeface="Calibri" panose="020F0502020204030204" pitchFamily="34" charset="0"/>
+              </a:rPr>
               <a:t>self.__name</a:t>
             </a:r>
             <a:r>
-              <a:rPr lang="en-US" dirty="0"/>
+              <a:rPr lang="en-US" sz="1600" dirty="0">
+                <a:latin typeface="Calibri" panose="020F0502020204030204" pitchFamily="34" charset="0"/>
+                <a:cs typeface="Calibri" panose="020F0502020204030204" pitchFamily="34" charset="0"/>
+              </a:rPr>
               <a:t> = name</a:t>
             </a:r>
           </a:p>
           <a:p>
             <a:pPr marL="0" indent="0">
+              <a:spcBef>
+                <a:spcPts val="0"/>
+              </a:spcBef>
               <a:buNone/>
             </a:pPr>
-            <a:endParaRPr lang="en-US" dirty="0"/>
+            <a:endParaRPr lang="en-US" sz="1600" dirty="0">
+              <a:latin typeface="Calibri" panose="020F0502020204030204" pitchFamily="34" charset="0"/>
+              <a:cs typeface="Calibri" panose="020F0502020204030204" pitchFamily="34" charset="0"/>
+            </a:endParaRPr>
           </a:p>
           <a:p>
             <a:pPr marL="0" indent="0">
+              <a:spcBef>
+                <a:spcPts val="0"/>
+              </a:spcBef>
               <a:buNone/>
             </a:pPr>
             <a:r>
-              <a:rPr lang="en-US" dirty="0"/>
-              <a:t>    </a:t>
-            </a:r>
-            <a:r>
-              <a:rPr lang="en-US" dirty="0" err="1"/>
-              <a:t>def</a:t>
-            </a:r>
-            <a:r>
-              <a:rPr lang="en-US" dirty="0"/>
-              <a:t> </a:t>
-            </a:r>
-            <a:r>
-              <a:rPr lang="en-US" dirty="0" err="1"/>
+              <a:rPr lang="en-US" sz="1600" dirty="0">
+                <a:latin typeface="Calibri" panose="020F0502020204030204" pitchFamily="34" charset="0"/>
+                <a:cs typeface="Calibri" panose="020F0502020204030204" pitchFamily="34" charset="0"/>
+              </a:rPr>
+              <a:t>    def </a:t>
+            </a:r>
+            <a:r>
+              <a:rPr lang="en-US" sz="1600" dirty="0" err="1">
+                <a:latin typeface="Calibri" panose="020F0502020204030204" pitchFamily="34" charset="0"/>
+                <a:cs typeface="Calibri" panose="020F0502020204030204" pitchFamily="34" charset="0"/>
+              </a:rPr>
               <a:t>getName</a:t>
             </a:r>
             <a:r>
-              <a:rPr lang="en-US" dirty="0"/>
+              <a:rPr lang="en-US" sz="1600" dirty="0">
+                <a:latin typeface="Calibri" panose="020F0502020204030204" pitchFamily="34" charset="0"/>
+                <a:cs typeface="Calibri" panose="020F0502020204030204" pitchFamily="34" charset="0"/>
+              </a:rPr>
               <a:t>(self):</a:t>
             </a:r>
           </a:p>
           <a:p>
             <a:pPr marL="0" indent="0">
+              <a:spcBef>
+                <a:spcPts val="0"/>
+              </a:spcBef>
               <a:buNone/>
             </a:pPr>
             <a:r>
-              <a:rPr lang="en-US" dirty="0"/>
+              <a:rPr lang="en-US" sz="1600" dirty="0">
+                <a:latin typeface="Calibri" panose="020F0502020204030204" pitchFamily="34" charset="0"/>
+                <a:cs typeface="Calibri" panose="020F0502020204030204" pitchFamily="34" charset="0"/>
+              </a:rPr>
               <a:t>        return </a:t>
             </a:r>
             <a:r>
-              <a:rPr lang="en-US" dirty="0" err="1"/>
+              <a:rPr lang="en-US" sz="1600" dirty="0" err="1">
+                <a:latin typeface="Calibri" panose="020F0502020204030204" pitchFamily="34" charset="0"/>
+                <a:cs typeface="Calibri" panose="020F0502020204030204" pitchFamily="34" charset="0"/>
+              </a:rPr>
               <a:t>self.__name</a:t>
             </a:r>
-            <a:endParaRPr lang="en-US" dirty="0"/>
+            <a:endParaRPr lang="en-US" sz="1600" dirty="0">
+              <a:latin typeface="Calibri" panose="020F0502020204030204" pitchFamily="34" charset="0"/>
+              <a:cs typeface="Calibri" panose="020F0502020204030204" pitchFamily="34" charset="0"/>
+            </a:endParaRPr>
           </a:p>
           <a:p>
             <a:pPr marL="0" indent="0">
+              <a:spcBef>
+                <a:spcPts val="0"/>
+              </a:spcBef>
               <a:buNone/>
             </a:pPr>
-            <a:r>
-              <a:rPr lang="en-US"/>
-              <a:t>  </a:t>
-            </a:r>
-            <a:endParaRPr lang="en-US" dirty="0"/>
+            <a:endParaRPr lang="en-US" sz="1600" dirty="0">
+              <a:latin typeface="Calibri" panose="020F0502020204030204" pitchFamily="34" charset="0"/>
+              <a:cs typeface="Calibri" panose="020F0502020204030204" pitchFamily="34" charset="0"/>
+            </a:endParaRPr>
           </a:p>
           <a:p>
             <a:pPr marL="0" indent="0">
+              <a:spcBef>
+                <a:spcPts val="0"/>
+              </a:spcBef>
               <a:buNone/>
             </a:pPr>
             <a:r>
-              <a:rPr lang="en-US" dirty="0"/>
+              <a:rPr lang="en-US" sz="1600" dirty="0">
+                <a:latin typeface="Calibri" panose="020F0502020204030204" pitchFamily="34" charset="0"/>
+                <a:cs typeface="Calibri" panose="020F0502020204030204" pitchFamily="34" charset="0"/>
+              </a:rPr>
               <a:t>    </a:t>
             </a:r>
             <a:r>
-              <a:rPr lang="en-US" dirty="0" err="1"/>
+              <a:rPr lang="en-US" sz="1600" dirty="0" err="1">
+                <a:latin typeface="Calibri" panose="020F0502020204030204" pitchFamily="34" charset="0"/>
+                <a:cs typeface="Calibri" panose="020F0502020204030204" pitchFamily="34" charset="0"/>
+              </a:rPr>
               <a:t>def</a:t>
             </a:r>
             <a:r>
-              <a:rPr lang="en-US" dirty="0"/>
+              <a:rPr lang="en-US" sz="1600" dirty="0">
+                <a:latin typeface="Calibri" panose="020F0502020204030204" pitchFamily="34" charset="0"/>
+                <a:cs typeface="Calibri" panose="020F0502020204030204" pitchFamily="34" charset="0"/>
+              </a:rPr>
               <a:t> __</a:t>
             </a:r>
             <a:r>
-              <a:rPr lang="en-US" dirty="0" err="1"/>
+              <a:rPr lang="en-US" sz="1600" dirty="0" err="1">
+                <a:latin typeface="Calibri" panose="020F0502020204030204" pitchFamily="34" charset="0"/>
+                <a:cs typeface="Calibri" panose="020F0502020204030204" pitchFamily="34" charset="0"/>
+              </a:rPr>
               <a:t>str</a:t>
             </a:r>
             <a:r>
-              <a:rPr lang="en-US" dirty="0"/>
+              <a:rPr lang="en-US" sz="1600" dirty="0">
+                <a:latin typeface="Calibri" panose="020F0502020204030204" pitchFamily="34" charset="0"/>
+                <a:cs typeface="Calibri" panose="020F0502020204030204" pitchFamily="34" charset="0"/>
+              </a:rPr>
               <a:t>__(self):</a:t>
             </a:r>
           </a:p>
           <a:p>
             <a:pPr marL="0" indent="0">
+              <a:spcBef>
+                <a:spcPts val="0"/>
+              </a:spcBef>
               <a:buNone/>
             </a:pPr>
             <a:r>
-              <a:rPr lang="en-US" dirty="0"/>
+              <a:rPr lang="en-US" sz="1600" dirty="0">
+                <a:latin typeface="Calibri" panose="020F0502020204030204" pitchFamily="34" charset="0"/>
+                <a:cs typeface="Calibri" panose="020F0502020204030204" pitchFamily="34" charset="0"/>
+              </a:rPr>
               <a:t>        return "name: %</a:t>
             </a:r>
             <a:r>
-              <a:rPr lang="en-US" dirty="0" err="1"/>
+              <a:rPr lang="en-US" sz="1600" dirty="0" err="1">
+                <a:latin typeface="Calibri" panose="020F0502020204030204" pitchFamily="34" charset="0"/>
+                <a:cs typeface="Calibri" panose="020F0502020204030204" pitchFamily="34" charset="0"/>
+              </a:rPr>
               <a:t>s"%self.__name</a:t>
             </a:r>
-            <a:endParaRPr lang="en-US" dirty="0"/>
+            <a:endParaRPr lang="en-US" sz="1600" dirty="0">
+              <a:latin typeface="Calibri" panose="020F0502020204030204" pitchFamily="34" charset="0"/>
+              <a:cs typeface="Calibri" panose="020F0502020204030204" pitchFamily="34" charset="0"/>
+            </a:endParaRPr>
           </a:p>
           <a:p>
             <a:pPr marL="0" indent="0">
+              <a:spcBef>
+                <a:spcPts val="0"/>
+              </a:spcBef>
               <a:buNone/>
             </a:pPr>
-            <a:endParaRPr lang="en-US" dirty="0"/>
+            <a:endParaRPr lang="en-US" sz="1600" dirty="0">
+              <a:latin typeface="Calibri" panose="020F0502020204030204" pitchFamily="34" charset="0"/>
+              <a:cs typeface="Calibri" panose="020F0502020204030204" pitchFamily="34" charset="0"/>
+            </a:endParaRPr>
           </a:p>
           <a:p>
             <a:pPr>
+              <a:spcBef>
+                <a:spcPts val="0"/>
+              </a:spcBef>
               <a:buFont typeface="Arial" panose="020B0604020202020204" pitchFamily="34" charset="0"/>
               <a:buChar char="•"/>
             </a:pPr>
             <a:r>
-              <a:rPr lang="en-US" dirty="0"/>
+              <a:rPr lang="en-US" sz="1600" dirty="0">
+                <a:latin typeface="Calibri" panose="020F0502020204030204" pitchFamily="34" charset="0"/>
+                <a:cs typeface="Calibri" panose="020F0502020204030204" pitchFamily="34" charset="0"/>
+              </a:rPr>
               <a:t>The first method </a:t>
             </a:r>
             <a:r>
-              <a:rPr lang="en-US" i="1" dirty="0"/>
+              <a:rPr lang="en-US" sz="1600" i="1" dirty="0">
+                <a:latin typeface="Calibri" panose="020F0502020204030204" pitchFamily="34" charset="0"/>
+                <a:cs typeface="Calibri" panose="020F0502020204030204" pitchFamily="34" charset="0"/>
+              </a:rPr>
               <a:t>__</a:t>
             </a:r>
             <a:r>
-              <a:rPr lang="en-US" i="1" dirty="0" err="1"/>
+              <a:rPr lang="en-US" sz="1600" i="1" dirty="0" err="1">
+                <a:latin typeface="Calibri" panose="020F0502020204030204" pitchFamily="34" charset="0"/>
+                <a:cs typeface="Calibri" panose="020F0502020204030204" pitchFamily="34" charset="0"/>
+              </a:rPr>
               <a:t>init</a:t>
             </a:r>
             <a:r>
-              <a:rPr lang="en-US" i="1" dirty="0"/>
+              <a:rPr lang="en-US" sz="1600" i="1" dirty="0">
+                <a:latin typeface="Calibri" panose="020F0502020204030204" pitchFamily="34" charset="0"/>
+                <a:cs typeface="Calibri" panose="020F0502020204030204" pitchFamily="34" charset="0"/>
+              </a:rPr>
               <a:t>__()</a:t>
             </a:r>
             <a:r>
-              <a:rPr lang="en-US" dirty="0"/>
+              <a:rPr lang="en-US" sz="1600" dirty="0">
+                <a:latin typeface="Calibri" panose="020F0502020204030204" pitchFamily="34" charset="0"/>
+                <a:cs typeface="Calibri" panose="020F0502020204030204" pitchFamily="34" charset="0"/>
+              </a:rPr>
               <a:t> is a special method, which is called class constructor or initialization method that Python calls when you create a new instance of this class.</a:t>
             </a:r>
           </a:p>
           <a:p>
             <a:pPr>
+              <a:spcBef>
+                <a:spcPts val="0"/>
+              </a:spcBef>
               <a:buFont typeface="Arial" panose="020B0604020202020204" pitchFamily="34" charset="0"/>
               <a:buChar char="•"/>
             </a:pPr>
             <a:r>
-              <a:rPr lang="en-US" dirty="0"/>
+              <a:rPr lang="en-US" sz="1600" dirty="0">
+                <a:latin typeface="Calibri" panose="020F0502020204030204" pitchFamily="34" charset="0"/>
+                <a:cs typeface="Calibri" panose="020F0502020204030204" pitchFamily="34" charset="0"/>
+              </a:rPr>
               <a:t> Python adds the </a:t>
             </a:r>
             <a:r>
-              <a:rPr lang="en-US" i="1" dirty="0"/>
+              <a:rPr lang="en-US" sz="1600" i="1" dirty="0">
+                <a:latin typeface="Calibri" panose="020F0502020204030204" pitchFamily="34" charset="0"/>
+                <a:cs typeface="Calibri" panose="020F0502020204030204" pitchFamily="34" charset="0"/>
+              </a:rPr>
               <a:t>self</a:t>
             </a:r>
             <a:r>
-              <a:rPr lang="en-US" dirty="0"/>
+              <a:rPr lang="en-US" sz="1600" dirty="0">
+                <a:latin typeface="Calibri" panose="020F0502020204030204" pitchFamily="34" charset="0"/>
+                <a:cs typeface="Calibri" panose="020F0502020204030204" pitchFamily="34" charset="0"/>
+              </a:rPr>
               <a:t> argument to the method; you do not need to include it when you call the methods.</a:t>
             </a:r>
           </a:p>
@@ -11083,6 +11227,833 @@
 </p:sld>
 </file>
 
+<file path=ppt/slides/slide16.xml><?xml version="1.0" encoding="utf-8"?>
+<p:sld xmlns:a="http://schemas.openxmlformats.org/drawingml/2006/main" xmlns:r="http://schemas.openxmlformats.org/officeDocument/2006/relationships" xmlns:p="http://schemas.openxmlformats.org/presentationml/2006/main">
+  <p:cSld>
+    <p:spTree>
+      <p:nvGrpSpPr>
+        <p:cNvPr id="1" name=""/>
+        <p:cNvGrpSpPr/>
+        <p:nvPr/>
+      </p:nvGrpSpPr>
+      <p:grpSpPr>
+        <a:xfrm>
+          <a:off x="0" y="0"/>
+          <a:ext cx="0" cy="0"/>
+          <a:chOff x="0" y="0"/>
+          <a:chExt cx="0" cy="0"/>
+        </a:xfrm>
+      </p:grpSpPr>
+      <p:sp>
+        <p:nvSpPr>
+          <p:cNvPr id="2" name="Title 1">
+            <a:extLst>
+              <a:ext uri="{FF2B5EF4-FFF2-40B4-BE49-F238E27FC236}">
+                <a16:creationId xmlns:a16="http://schemas.microsoft.com/office/drawing/2014/main" id="{9B5183EE-C5FC-5F42-B488-26666DBA8E89}"/>
+              </a:ext>
+            </a:extLst>
+          </p:cNvPr>
+          <p:cNvSpPr>
+            <a:spLocks noGrp="1"/>
+          </p:cNvSpPr>
+          <p:nvPr>
+            <p:ph type="title"/>
+          </p:nvPr>
+        </p:nvSpPr>
+        <p:spPr/>
+        <p:txBody>
+          <a:bodyPr/>
+          <a:lstStyle/>
+          <a:p>
+            <a:r>
+              <a:rPr lang="en-US" dirty="0"/>
+              <a:t>Unit Test</a:t>
+            </a:r>
+          </a:p>
+        </p:txBody>
+      </p:sp>
+      <p:sp>
+        <p:nvSpPr>
+          <p:cNvPr id="3" name="Text Placeholder 2">
+            <a:extLst>
+              <a:ext uri="{FF2B5EF4-FFF2-40B4-BE49-F238E27FC236}">
+                <a16:creationId xmlns:a16="http://schemas.microsoft.com/office/drawing/2014/main" id="{3BD8AB73-43E5-6B4F-9656-0D0196D8F667}"/>
+              </a:ext>
+            </a:extLst>
+          </p:cNvPr>
+          <p:cNvSpPr>
+            <a:spLocks noGrp="1"/>
+          </p:cNvSpPr>
+          <p:nvPr>
+            <p:ph type="body" idx="1"/>
+          </p:nvPr>
+        </p:nvSpPr>
+        <p:spPr/>
+        <p:txBody>
+          <a:bodyPr/>
+          <a:lstStyle/>
+          <a:p>
+            <a:r>
+              <a:rPr lang="en-CA" dirty="0"/>
+              <a:t>						----</a:t>
+            </a:r>
+            <a:r>
+              <a:rPr lang="en-CA" dirty="0" err="1"/>
+              <a:t>unittest</a:t>
+            </a:r>
+            <a:endParaRPr lang="en-US" dirty="0"/>
+          </a:p>
+        </p:txBody>
+      </p:sp>
+    </p:spTree>
+    <p:extLst>
+      <p:ext uri="{BB962C8B-B14F-4D97-AF65-F5344CB8AC3E}">
+        <p14:creationId xmlns:p14="http://schemas.microsoft.com/office/powerpoint/2010/main" val="3041980868"/>
+      </p:ext>
+    </p:extLst>
+  </p:cSld>
+  <p:clrMapOvr>
+    <a:masterClrMapping/>
+  </p:clrMapOvr>
+</p:sld>
+</file>
+
+<file path=ppt/slides/slide17.xml><?xml version="1.0" encoding="utf-8"?>
+<p:sld xmlns:a="http://schemas.openxmlformats.org/drawingml/2006/main" xmlns:r="http://schemas.openxmlformats.org/officeDocument/2006/relationships" xmlns:p="http://schemas.openxmlformats.org/presentationml/2006/main">
+  <p:cSld>
+    <p:spTree>
+      <p:nvGrpSpPr>
+        <p:cNvPr id="1" name=""/>
+        <p:cNvGrpSpPr/>
+        <p:nvPr/>
+      </p:nvGrpSpPr>
+      <p:grpSpPr>
+        <a:xfrm>
+          <a:off x="0" y="0"/>
+          <a:ext cx="0" cy="0"/>
+          <a:chOff x="0" y="0"/>
+          <a:chExt cx="0" cy="0"/>
+        </a:xfrm>
+      </p:grpSpPr>
+      <p:sp>
+        <p:nvSpPr>
+          <p:cNvPr id="2" name="Title 1">
+            <a:extLst>
+              <a:ext uri="{FF2B5EF4-FFF2-40B4-BE49-F238E27FC236}">
+                <a16:creationId xmlns:a16="http://schemas.microsoft.com/office/drawing/2014/main" id="{77D493D6-31A6-DF43-9D7E-7D4BAF7CD2D9}"/>
+              </a:ext>
+            </a:extLst>
+          </p:cNvPr>
+          <p:cNvSpPr>
+            <a:spLocks noGrp="1"/>
+          </p:cNvSpPr>
+          <p:nvPr>
+            <p:ph type="title"/>
+          </p:nvPr>
+        </p:nvSpPr>
+        <p:spPr/>
+        <p:txBody>
+          <a:bodyPr/>
+          <a:lstStyle/>
+          <a:p>
+            <a:r>
+              <a:rPr lang="en-US" dirty="0"/>
+              <a:t>Source code</a:t>
+            </a:r>
+          </a:p>
+        </p:txBody>
+      </p:sp>
+      <p:sp>
+        <p:nvSpPr>
+          <p:cNvPr id="3" name="Content Placeholder 2">
+            <a:extLst>
+              <a:ext uri="{FF2B5EF4-FFF2-40B4-BE49-F238E27FC236}">
+                <a16:creationId xmlns:a16="http://schemas.microsoft.com/office/drawing/2014/main" id="{9920259C-F206-4045-B836-D897F1580294}"/>
+              </a:ext>
+            </a:extLst>
+          </p:cNvPr>
+          <p:cNvSpPr>
+            <a:spLocks noGrp="1"/>
+          </p:cNvSpPr>
+          <p:nvPr>
+            <p:ph idx="1"/>
+          </p:nvPr>
+        </p:nvSpPr>
+        <p:spPr/>
+        <p:txBody>
+          <a:bodyPr>
+            <a:normAutofit fontScale="92500" lnSpcReduction="10000"/>
+          </a:bodyPr>
+          <a:lstStyle/>
+          <a:p>
+            <a:r>
+              <a:rPr lang="en-CA" b="1" dirty="0"/>
+              <a:t>def </a:t>
+            </a:r>
+            <a:r>
+              <a:rPr lang="en-CA" dirty="0" err="1"/>
+              <a:t>gass_sum</a:t>
+            </a:r>
+            <a:r>
+              <a:rPr lang="en-CA" dirty="0"/>
+              <a:t>(count=100):</a:t>
+            </a:r>
+            <a:br>
+              <a:rPr lang="en-CA" dirty="0"/>
+            </a:br>
+            <a:r>
+              <a:rPr lang="en-CA" dirty="0"/>
+              <a:t>    </a:t>
+            </a:r>
+            <a:r>
+              <a:rPr lang="en-CA" b="1" dirty="0"/>
+              <a:t>if </a:t>
+            </a:r>
+            <a:r>
+              <a:rPr lang="en-CA" dirty="0"/>
+              <a:t>type(count).__name__ != </a:t>
+            </a:r>
+            <a:r>
+              <a:rPr lang="en-CA" b="1" dirty="0"/>
+              <a:t>'</a:t>
+            </a:r>
+            <a:r>
+              <a:rPr lang="en-CA" b="1" dirty="0" err="1"/>
+              <a:t>int</a:t>
+            </a:r>
+            <a:r>
+              <a:rPr lang="en-CA" b="1" dirty="0"/>
+              <a:t>'</a:t>
+            </a:r>
+            <a:r>
+              <a:rPr lang="en-CA" dirty="0"/>
+              <a:t>:</a:t>
+            </a:r>
+            <a:br>
+              <a:rPr lang="en-CA" dirty="0"/>
+            </a:br>
+            <a:r>
+              <a:rPr lang="en-CA" dirty="0"/>
+              <a:t>        </a:t>
+            </a:r>
+            <a:r>
+              <a:rPr lang="en-CA" b="1" dirty="0"/>
+              <a:t>return "</a:t>
+            </a:r>
+            <a:r>
+              <a:rPr lang="en-CA" b="1" dirty="0" err="1"/>
+              <a:t>Error,type</a:t>
+            </a:r>
+            <a:r>
+              <a:rPr lang="en-CA" b="1" dirty="0"/>
+              <a:t> not supported"</a:t>
+            </a:r>
+            <a:br>
+              <a:rPr lang="en-CA" b="1" dirty="0"/>
+            </a:br>
+            <a:r>
+              <a:rPr lang="en-CA" b="1" dirty="0"/>
+              <a:t>    </a:t>
+            </a:r>
+            <a:r>
+              <a:rPr lang="en-CA" dirty="0"/>
+              <a:t>sum = 0</a:t>
+            </a:r>
+            <a:br>
+              <a:rPr lang="en-CA" dirty="0"/>
+            </a:br>
+            <a:r>
+              <a:rPr lang="en-CA" dirty="0"/>
+              <a:t>    </a:t>
+            </a:r>
+            <a:r>
+              <a:rPr lang="en-CA" b="1" dirty="0"/>
+              <a:t>for </a:t>
+            </a:r>
+            <a:r>
+              <a:rPr lang="en-CA" dirty="0"/>
+              <a:t>x </a:t>
+            </a:r>
+            <a:r>
+              <a:rPr lang="en-CA" b="1" dirty="0"/>
+              <a:t>in </a:t>
+            </a:r>
+            <a:r>
+              <a:rPr lang="en-CA" dirty="0"/>
+              <a:t>range(count):</a:t>
+            </a:r>
+            <a:br>
+              <a:rPr lang="en-CA" dirty="0"/>
+            </a:br>
+            <a:r>
+              <a:rPr lang="en-CA" dirty="0"/>
+              <a:t>        </a:t>
+            </a:r>
+            <a:r>
+              <a:rPr lang="en-CA" i="1" dirty="0"/>
+              <a:t># </a:t>
+            </a:r>
+            <a:r>
+              <a:rPr lang="en-CA" i="1" dirty="0" err="1"/>
+              <a:t>tmp</a:t>
+            </a:r>
+            <a:r>
+              <a:rPr lang="en-CA" i="1" dirty="0"/>
+              <a:t> is the temperate value of </a:t>
+            </a:r>
+            <a:r>
+              <a:rPr lang="en-CA" i="1" dirty="0" err="1"/>
+              <a:t>th</a:t>
+            </a:r>
+            <a:r>
+              <a:rPr lang="en-CA" i="1" dirty="0"/>
+              <a:t> x+1.</a:t>
+            </a:r>
+            <a:br>
+              <a:rPr lang="en-CA" i="1" dirty="0"/>
+            </a:br>
+            <a:r>
+              <a:rPr lang="en-CA" i="1" dirty="0"/>
+              <a:t>        # e.g. when x = 0, </a:t>
+            </a:r>
+            <a:r>
+              <a:rPr lang="en-CA" i="1" dirty="0" err="1"/>
+              <a:t>tmp</a:t>
+            </a:r>
+            <a:r>
+              <a:rPr lang="en-CA" i="1" dirty="0"/>
+              <a:t> should be 1</a:t>
+            </a:r>
+            <a:br>
+              <a:rPr lang="en-CA" i="1" dirty="0"/>
+            </a:br>
+            <a:r>
+              <a:rPr lang="en-CA" i="1" dirty="0"/>
+              <a:t>        </a:t>
+            </a:r>
+            <a:r>
+              <a:rPr lang="en-CA" dirty="0" err="1"/>
+              <a:t>tmp</a:t>
+            </a:r>
+            <a:r>
+              <a:rPr lang="en-CA" dirty="0"/>
+              <a:t> = x + 1</a:t>
+            </a:r>
+            <a:br>
+              <a:rPr lang="en-CA" dirty="0"/>
+            </a:br>
+            <a:r>
+              <a:rPr lang="en-CA" dirty="0"/>
+              <a:t>        sum += </a:t>
+            </a:r>
+            <a:r>
+              <a:rPr lang="en-CA" dirty="0" err="1"/>
+              <a:t>tmp</a:t>
+            </a:r>
+            <a:br>
+              <a:rPr lang="en-CA" dirty="0"/>
+            </a:br>
+            <a:r>
+              <a:rPr lang="en-CA" dirty="0"/>
+              <a:t>    </a:t>
+            </a:r>
+            <a:r>
+              <a:rPr lang="en-CA" b="1" dirty="0"/>
+              <a:t>return </a:t>
+            </a:r>
+            <a:r>
+              <a:rPr lang="en-CA" dirty="0"/>
+              <a:t>sum</a:t>
+            </a:r>
+            <a:br>
+              <a:rPr lang="en-CA" dirty="0"/>
+            </a:br>
+            <a:br>
+              <a:rPr lang="en-CA" dirty="0"/>
+            </a:br>
+            <a:br>
+              <a:rPr lang="en-CA" dirty="0"/>
+            </a:br>
+            <a:r>
+              <a:rPr lang="en-CA" b="1" dirty="0"/>
+              <a:t>if </a:t>
+            </a:r>
+            <a:r>
+              <a:rPr lang="en-CA" dirty="0"/>
+              <a:t>__name__ == </a:t>
+            </a:r>
+            <a:r>
+              <a:rPr lang="en-CA" b="1" dirty="0"/>
+              <a:t>"__main__"</a:t>
+            </a:r>
+            <a:r>
+              <a:rPr lang="en-CA" dirty="0"/>
+              <a:t>:</a:t>
+            </a:r>
+            <a:br>
+              <a:rPr lang="en-CA" dirty="0"/>
+            </a:br>
+            <a:r>
+              <a:rPr lang="en-CA" dirty="0"/>
+              <a:t>    </a:t>
+            </a:r>
+            <a:r>
+              <a:rPr lang="en-CA" dirty="0" err="1"/>
+              <a:t>gass_sum</a:t>
+            </a:r>
+            <a:r>
+              <a:rPr lang="en-CA" dirty="0"/>
+              <a:t>(100)</a:t>
+            </a:r>
+            <a:br>
+              <a:rPr lang="en-CA" dirty="0"/>
+            </a:br>
+            <a:r>
+              <a:rPr lang="en-CA" dirty="0"/>
+              <a:t>    </a:t>
+            </a:r>
+            <a:r>
+              <a:rPr lang="en-CA" dirty="0" err="1"/>
+              <a:t>gass_sum</a:t>
+            </a:r>
+            <a:r>
+              <a:rPr lang="en-CA" dirty="0"/>
+              <a:t>(-100)</a:t>
+            </a:r>
+            <a:endParaRPr lang="en-US" dirty="0"/>
+          </a:p>
+        </p:txBody>
+      </p:sp>
+    </p:spTree>
+    <p:extLst>
+      <p:ext uri="{BB962C8B-B14F-4D97-AF65-F5344CB8AC3E}">
+        <p14:creationId xmlns:p14="http://schemas.microsoft.com/office/powerpoint/2010/main" val="2347766569"/>
+      </p:ext>
+    </p:extLst>
+  </p:cSld>
+  <p:clrMapOvr>
+    <a:masterClrMapping/>
+  </p:clrMapOvr>
+</p:sld>
+</file>
+
+<file path=ppt/slides/slide18.xml><?xml version="1.0" encoding="utf-8"?>
+<p:sld xmlns:a="http://schemas.openxmlformats.org/drawingml/2006/main" xmlns:r="http://schemas.openxmlformats.org/officeDocument/2006/relationships" xmlns:p="http://schemas.openxmlformats.org/presentationml/2006/main">
+  <p:cSld>
+    <p:spTree>
+      <p:nvGrpSpPr>
+        <p:cNvPr id="1" name=""/>
+        <p:cNvGrpSpPr/>
+        <p:nvPr/>
+      </p:nvGrpSpPr>
+      <p:grpSpPr>
+        <a:xfrm>
+          <a:off x="0" y="0"/>
+          <a:ext cx="0" cy="0"/>
+          <a:chOff x="0" y="0"/>
+          <a:chExt cx="0" cy="0"/>
+        </a:xfrm>
+      </p:grpSpPr>
+      <p:sp>
+        <p:nvSpPr>
+          <p:cNvPr id="2" name="Title 1">
+            <a:extLst>
+              <a:ext uri="{FF2B5EF4-FFF2-40B4-BE49-F238E27FC236}">
+                <a16:creationId xmlns:a16="http://schemas.microsoft.com/office/drawing/2014/main" id="{5E30DAB2-2683-784B-A4CF-613A7F1C3746}"/>
+              </a:ext>
+            </a:extLst>
+          </p:cNvPr>
+          <p:cNvSpPr>
+            <a:spLocks noGrp="1"/>
+          </p:cNvSpPr>
+          <p:nvPr>
+            <p:ph type="title"/>
+          </p:nvPr>
+        </p:nvSpPr>
+        <p:spPr/>
+        <p:txBody>
+          <a:bodyPr/>
+          <a:lstStyle/>
+          <a:p>
+            <a:r>
+              <a:rPr lang="en-US" dirty="0" err="1"/>
+              <a:t>Unittest</a:t>
+            </a:r>
+            <a:endParaRPr lang="en-US" dirty="0"/>
+          </a:p>
+        </p:txBody>
+      </p:sp>
+      <p:sp>
+        <p:nvSpPr>
+          <p:cNvPr id="3" name="Content Placeholder 2">
+            <a:extLst>
+              <a:ext uri="{FF2B5EF4-FFF2-40B4-BE49-F238E27FC236}">
+                <a16:creationId xmlns:a16="http://schemas.microsoft.com/office/drawing/2014/main" id="{40D6FDF3-35E6-2F44-B049-D4C975502D97}"/>
+              </a:ext>
+            </a:extLst>
+          </p:cNvPr>
+          <p:cNvSpPr>
+            <a:spLocks noGrp="1"/>
+          </p:cNvSpPr>
+          <p:nvPr>
+            <p:ph idx="1"/>
+          </p:nvPr>
+        </p:nvSpPr>
+        <p:spPr/>
+        <p:txBody>
+          <a:bodyPr>
+            <a:normAutofit/>
+          </a:bodyPr>
+          <a:lstStyle/>
+          <a:p>
+            <a:r>
+              <a:rPr lang="en-CA" b="1" dirty="0"/>
+              <a:t>import </a:t>
+            </a:r>
+            <a:r>
+              <a:rPr lang="en-CA" dirty="0" err="1"/>
+              <a:t>unittest</a:t>
+            </a:r>
+            <a:br>
+              <a:rPr lang="en-CA" dirty="0"/>
+            </a:br>
+            <a:r>
+              <a:rPr lang="en-CA" b="1" dirty="0"/>
+              <a:t>from </a:t>
+            </a:r>
+            <a:r>
+              <a:rPr lang="en-CA" dirty="0"/>
+              <a:t>course2.guass_function </a:t>
+            </a:r>
+            <a:r>
+              <a:rPr lang="en-CA" b="1" dirty="0"/>
+              <a:t>import </a:t>
+            </a:r>
+            <a:r>
+              <a:rPr lang="en-CA" dirty="0"/>
+              <a:t>*</a:t>
+            </a:r>
+            <a:br>
+              <a:rPr lang="en-CA" dirty="0"/>
+            </a:br>
+            <a:br>
+              <a:rPr lang="en-CA" dirty="0"/>
+            </a:br>
+            <a:br>
+              <a:rPr lang="en-CA" dirty="0"/>
+            </a:br>
+            <a:r>
+              <a:rPr lang="en-CA" b="1" dirty="0"/>
+              <a:t>class </a:t>
+            </a:r>
+            <a:r>
+              <a:rPr lang="en-CA" dirty="0" err="1"/>
+              <a:t>TestGaussSum</a:t>
+            </a:r>
+            <a:r>
+              <a:rPr lang="en-CA" dirty="0"/>
+              <a:t>(</a:t>
+            </a:r>
+            <a:r>
+              <a:rPr lang="en-CA" dirty="0" err="1"/>
+              <a:t>unittest.TestCase</a:t>
+            </a:r>
+            <a:r>
+              <a:rPr lang="en-CA" dirty="0"/>
+              <a:t>):</a:t>
+            </a:r>
+            <a:br>
+              <a:rPr lang="en-CA" dirty="0"/>
+            </a:br>
+            <a:r>
+              <a:rPr lang="en-CA" dirty="0"/>
+              <a:t>    </a:t>
+            </a:r>
+            <a:r>
+              <a:rPr lang="en-CA" b="1" dirty="0"/>
+              <a:t>def </a:t>
+            </a:r>
+            <a:r>
+              <a:rPr lang="en-CA" dirty="0" err="1"/>
+              <a:t>test_gass_sum</a:t>
+            </a:r>
+            <a:r>
+              <a:rPr lang="en-CA" dirty="0"/>
+              <a:t>(self):</a:t>
+            </a:r>
+            <a:br>
+              <a:rPr lang="en-CA" dirty="0"/>
+            </a:br>
+            <a:r>
+              <a:rPr lang="en-CA" dirty="0"/>
+              <a:t>        </a:t>
+            </a:r>
+            <a:r>
+              <a:rPr lang="en-CA" dirty="0" err="1"/>
+              <a:t>self.assertEqual</a:t>
+            </a:r>
+            <a:r>
+              <a:rPr lang="en-CA" dirty="0"/>
+              <a:t>(</a:t>
+            </a:r>
+            <a:r>
+              <a:rPr lang="en-CA" dirty="0" err="1"/>
+              <a:t>gass_sum</a:t>
+            </a:r>
+            <a:r>
+              <a:rPr lang="en-CA" dirty="0"/>
+              <a:t>(100), 5050)</a:t>
+            </a:r>
+            <a:br>
+              <a:rPr lang="en-CA" dirty="0"/>
+            </a:br>
+            <a:r>
+              <a:rPr lang="en-CA" b="1" dirty="0"/>
+              <a:t>if </a:t>
+            </a:r>
+            <a:r>
+              <a:rPr lang="en-CA" dirty="0"/>
+              <a:t>__name__ == </a:t>
+            </a:r>
+            <a:r>
+              <a:rPr lang="en-CA" b="1" dirty="0"/>
+              <a:t>"__main__"</a:t>
+            </a:r>
+            <a:r>
+              <a:rPr lang="en-CA" dirty="0"/>
+              <a:t>:</a:t>
+            </a:r>
+            <a:br>
+              <a:rPr lang="en-CA" dirty="0"/>
+            </a:br>
+            <a:r>
+              <a:rPr lang="en-CA" dirty="0"/>
+              <a:t>    </a:t>
+            </a:r>
+            <a:r>
+              <a:rPr lang="en-CA" dirty="0" err="1"/>
+              <a:t>unittest.main</a:t>
+            </a:r>
+            <a:r>
+              <a:rPr lang="en-CA" dirty="0"/>
+              <a:t>()</a:t>
+            </a:r>
+            <a:br>
+              <a:rPr lang="en-CA" dirty="0"/>
+            </a:br>
+            <a:endParaRPr lang="en-US" dirty="0"/>
+          </a:p>
+        </p:txBody>
+      </p:sp>
+    </p:spTree>
+    <p:extLst>
+      <p:ext uri="{BB962C8B-B14F-4D97-AF65-F5344CB8AC3E}">
+        <p14:creationId xmlns:p14="http://schemas.microsoft.com/office/powerpoint/2010/main" val="1719700745"/>
+      </p:ext>
+    </p:extLst>
+  </p:cSld>
+  <p:clrMapOvr>
+    <a:masterClrMapping/>
+  </p:clrMapOvr>
+</p:sld>
+</file>
+
+<file path=ppt/slides/slide19.xml><?xml version="1.0" encoding="utf-8"?>
+<p:sld xmlns:a="http://schemas.openxmlformats.org/drawingml/2006/main" xmlns:r="http://schemas.openxmlformats.org/officeDocument/2006/relationships" xmlns:p="http://schemas.openxmlformats.org/presentationml/2006/main">
+  <p:cSld>
+    <p:spTree>
+      <p:nvGrpSpPr>
+        <p:cNvPr id="1" name=""/>
+        <p:cNvGrpSpPr/>
+        <p:nvPr/>
+      </p:nvGrpSpPr>
+      <p:grpSpPr>
+        <a:xfrm>
+          <a:off x="0" y="0"/>
+          <a:ext cx="0" cy="0"/>
+          <a:chOff x="0" y="0"/>
+          <a:chExt cx="0" cy="0"/>
+        </a:xfrm>
+      </p:grpSpPr>
+      <p:sp>
+        <p:nvSpPr>
+          <p:cNvPr id="2" name="Title 1">
+            <a:extLst>
+              <a:ext uri="{FF2B5EF4-FFF2-40B4-BE49-F238E27FC236}">
+                <a16:creationId xmlns:a16="http://schemas.microsoft.com/office/drawing/2014/main" id="{B1B5F4B1-44B5-D949-A740-203A6C856D17}"/>
+              </a:ext>
+            </a:extLst>
+          </p:cNvPr>
+          <p:cNvSpPr>
+            <a:spLocks noGrp="1"/>
+          </p:cNvSpPr>
+          <p:nvPr>
+            <p:ph type="title"/>
+          </p:nvPr>
+        </p:nvSpPr>
+        <p:spPr/>
+        <p:txBody>
+          <a:bodyPr/>
+          <a:lstStyle/>
+          <a:p>
+            <a:r>
+              <a:rPr lang="en-US" dirty="0"/>
+              <a:t>Asset Types</a:t>
+            </a:r>
+          </a:p>
+        </p:txBody>
+      </p:sp>
+      <p:sp>
+        <p:nvSpPr>
+          <p:cNvPr id="3" name="Content Placeholder 2">
+            <a:extLst>
+              <a:ext uri="{FF2B5EF4-FFF2-40B4-BE49-F238E27FC236}">
+                <a16:creationId xmlns:a16="http://schemas.microsoft.com/office/drawing/2014/main" id="{8536787C-34DF-E441-AF05-05F1FC9E2F65}"/>
+              </a:ext>
+            </a:extLst>
+          </p:cNvPr>
+          <p:cNvSpPr>
+            <a:spLocks noGrp="1"/>
+          </p:cNvSpPr>
+          <p:nvPr>
+            <p:ph idx="1"/>
+          </p:nvPr>
+        </p:nvSpPr>
+        <p:spPr/>
+        <p:txBody>
+          <a:bodyPr/>
+          <a:lstStyle/>
+          <a:p>
+            <a:r>
+              <a:rPr lang="en-CA" dirty="0" err="1"/>
+              <a:t>self.assertEqual</a:t>
+            </a:r>
+            <a:r>
+              <a:rPr lang="en-CA" dirty="0"/>
+              <a:t>('</a:t>
+            </a:r>
+            <a:r>
+              <a:rPr lang="en-CA" dirty="0" err="1"/>
+              <a:t>foo'.upper</a:t>
+            </a:r>
+            <a:r>
+              <a:rPr lang="en-CA" dirty="0"/>
+              <a:t>(), 'FOO’)</a:t>
+            </a:r>
+          </a:p>
+          <a:p>
+            <a:r>
+              <a:rPr lang="en-CA" dirty="0" err="1"/>
+              <a:t>self.assertTrue</a:t>
+            </a:r>
+            <a:r>
+              <a:rPr lang="en-CA" dirty="0"/>
+              <a:t>('FOO'.</a:t>
+            </a:r>
+            <a:r>
+              <a:rPr lang="en-CA" dirty="0" err="1"/>
+              <a:t>isupper</a:t>
+            </a:r>
+            <a:r>
+              <a:rPr lang="en-CA" dirty="0"/>
+              <a:t>()) </a:t>
+            </a:r>
+          </a:p>
+          <a:p>
+            <a:r>
+              <a:rPr lang="en-CA" dirty="0" err="1"/>
+              <a:t>self.assertFalse</a:t>
+            </a:r>
+            <a:r>
+              <a:rPr lang="en-CA" dirty="0"/>
+              <a:t>('Foo'.</a:t>
+            </a:r>
+            <a:r>
+              <a:rPr lang="en-CA" dirty="0" err="1"/>
+              <a:t>isupper</a:t>
+            </a:r>
+            <a:r>
+              <a:rPr lang="en-CA" dirty="0"/>
+              <a:t>())</a:t>
+            </a:r>
+          </a:p>
+          <a:p>
+            <a:r>
+              <a:rPr lang="en-CA" dirty="0"/>
+              <a:t>def </a:t>
+            </a:r>
+            <a:r>
+              <a:rPr lang="en-CA" dirty="0" err="1"/>
+              <a:t>test_split</a:t>
+            </a:r>
+            <a:r>
+              <a:rPr lang="en-CA" dirty="0"/>
+              <a:t>(self): s = 'hello world' </a:t>
+            </a:r>
+            <a:r>
+              <a:rPr lang="en-CA" dirty="0" err="1"/>
+              <a:t>self.assertEqual</a:t>
+            </a:r>
+            <a:r>
+              <a:rPr lang="en-CA" dirty="0"/>
+              <a:t>(</a:t>
+            </a:r>
+            <a:r>
+              <a:rPr lang="en-CA" dirty="0" err="1"/>
+              <a:t>s.split</a:t>
+            </a:r>
+            <a:r>
+              <a:rPr lang="en-CA" dirty="0"/>
+              <a:t>(), ['hello', 'world'])</a:t>
+            </a:r>
+          </a:p>
+          <a:p>
+            <a:pPr lvl="2"/>
+            <a:r>
+              <a:rPr lang="en-CA" dirty="0"/>
+              <a:t>with </a:t>
+            </a:r>
+            <a:r>
+              <a:rPr lang="en-CA" dirty="0" err="1"/>
+              <a:t>self.assertRaises</a:t>
+            </a:r>
+            <a:r>
+              <a:rPr lang="en-CA" dirty="0"/>
+              <a:t>(</a:t>
+            </a:r>
+            <a:r>
+              <a:rPr lang="en-CA" dirty="0" err="1"/>
+              <a:t>TypeError</a:t>
+            </a:r>
+            <a:r>
+              <a:rPr lang="en-CA" dirty="0"/>
+              <a:t>): </a:t>
+            </a:r>
+            <a:r>
+              <a:rPr lang="en-CA" dirty="0" err="1"/>
+              <a:t>s.split</a:t>
+            </a:r>
+            <a:r>
+              <a:rPr lang="en-CA" dirty="0"/>
+              <a:t>(2)</a:t>
+            </a:r>
+            <a:endParaRPr lang="en-US" dirty="0"/>
+          </a:p>
+        </p:txBody>
+      </p:sp>
+    </p:spTree>
+    <p:extLst>
+      <p:ext uri="{BB962C8B-B14F-4D97-AF65-F5344CB8AC3E}">
+        <p14:creationId xmlns:p14="http://schemas.microsoft.com/office/powerpoint/2010/main" val="623916785"/>
+      </p:ext>
+    </p:extLst>
+  </p:cSld>
+  <p:clrMapOvr>
+    <a:masterClrMapping/>
+  </p:clrMapOvr>
+</p:sld>
+</file>
+
 <file path=ppt/slides/slide2.xml><?xml version="1.0" encoding="utf-8"?>
 <p:sld xmlns:a="http://schemas.openxmlformats.org/drawingml/2006/main" xmlns:r="http://schemas.openxmlformats.org/officeDocument/2006/relationships" xmlns:p="http://schemas.openxmlformats.org/presentationml/2006/main">
   <p:cSld>
@@ -12252,6 +13223,476 @@
     <p:extLst>
       <p:ext uri="{BB962C8B-B14F-4D97-AF65-F5344CB8AC3E}">
         <p14:creationId xmlns:p14="http://schemas.microsoft.com/office/powerpoint/2010/main" val="1108200295"/>
+      </p:ext>
+    </p:extLst>
+  </p:cSld>
+  <p:clrMapOvr>
+    <a:masterClrMapping/>
+  </p:clrMapOvr>
+</p:sld>
+</file>
+
+<file path=ppt/slides/slide20.xml><?xml version="1.0" encoding="utf-8"?>
+<p:sld xmlns:a="http://schemas.openxmlformats.org/drawingml/2006/main" xmlns:r="http://schemas.openxmlformats.org/officeDocument/2006/relationships" xmlns:p="http://schemas.openxmlformats.org/presentationml/2006/main">
+  <p:cSld>
+    <p:spTree>
+      <p:nvGrpSpPr>
+        <p:cNvPr id="1" name=""/>
+        <p:cNvGrpSpPr/>
+        <p:nvPr/>
+      </p:nvGrpSpPr>
+      <p:grpSpPr>
+        <a:xfrm>
+          <a:off x="0" y="0"/>
+          <a:ext cx="0" cy="0"/>
+          <a:chOff x="0" y="0"/>
+          <a:chExt cx="0" cy="0"/>
+        </a:xfrm>
+      </p:grpSpPr>
+      <p:sp>
+        <p:nvSpPr>
+          <p:cNvPr id="2" name="Title 1">
+            <a:extLst>
+              <a:ext uri="{FF2B5EF4-FFF2-40B4-BE49-F238E27FC236}">
+                <a16:creationId xmlns:a16="http://schemas.microsoft.com/office/drawing/2014/main" id="{C55BBD76-7B00-2F4A-89F1-FB16600E0792}"/>
+              </a:ext>
+            </a:extLst>
+          </p:cNvPr>
+          <p:cNvSpPr>
+            <a:spLocks noGrp="1"/>
+          </p:cNvSpPr>
+          <p:nvPr>
+            <p:ph type="title"/>
+          </p:nvPr>
+        </p:nvSpPr>
+        <p:spPr/>
+        <p:txBody>
+          <a:bodyPr/>
+          <a:lstStyle/>
+          <a:p>
+            <a:r>
+              <a:rPr lang="en-US" dirty="0"/>
+              <a:t>Skip tests</a:t>
+            </a:r>
+          </a:p>
+        </p:txBody>
+      </p:sp>
+      <p:sp>
+        <p:nvSpPr>
+          <p:cNvPr id="3" name="Content Placeholder 2">
+            <a:extLst>
+              <a:ext uri="{FF2B5EF4-FFF2-40B4-BE49-F238E27FC236}">
+                <a16:creationId xmlns:a16="http://schemas.microsoft.com/office/drawing/2014/main" id="{E7844E0C-2441-5C46-8567-B7A6DD8ABD6E}"/>
+              </a:ext>
+            </a:extLst>
+          </p:cNvPr>
+          <p:cNvSpPr>
+            <a:spLocks noGrp="1"/>
+          </p:cNvSpPr>
+          <p:nvPr>
+            <p:ph idx="1"/>
+          </p:nvPr>
+        </p:nvSpPr>
+        <p:spPr/>
+        <p:txBody>
+          <a:bodyPr/>
+          <a:lstStyle/>
+          <a:p>
+            <a:br>
+              <a:rPr lang="en-CA" dirty="0"/>
+            </a:br>
+            <a:r>
+              <a:rPr lang="en-CA" dirty="0"/>
+              <a:t>    @</a:t>
+            </a:r>
+            <a:r>
+              <a:rPr lang="en-CA" dirty="0" err="1"/>
+              <a:t>unittest.skip</a:t>
+            </a:r>
+            <a:r>
+              <a:rPr lang="en-CA" dirty="0"/>
+              <a:t>(</a:t>
+            </a:r>
+            <a:r>
+              <a:rPr lang="en-CA" b="1" dirty="0"/>
+              <a:t>"Not implemented"</a:t>
+            </a:r>
+            <a:r>
+              <a:rPr lang="en-CA" dirty="0"/>
+              <a:t>)</a:t>
+            </a:r>
+            <a:br>
+              <a:rPr lang="en-CA" dirty="0"/>
+            </a:br>
+            <a:r>
+              <a:rPr lang="en-CA" dirty="0"/>
+              <a:t>    </a:t>
+            </a:r>
+            <a:r>
+              <a:rPr lang="en-CA" b="1" dirty="0"/>
+              <a:t>def </a:t>
+            </a:r>
+            <a:r>
+              <a:rPr lang="en-CA" dirty="0" err="1"/>
+              <a:t>test_gass_sum_negative</a:t>
+            </a:r>
+            <a:r>
+              <a:rPr lang="en-CA" dirty="0"/>
+              <a:t>(self):</a:t>
+            </a:r>
+            <a:br>
+              <a:rPr lang="en-CA" dirty="0"/>
+            </a:br>
+            <a:r>
+              <a:rPr lang="en-CA" dirty="0"/>
+              <a:t>        </a:t>
+            </a:r>
+            <a:r>
+              <a:rPr lang="en-CA" dirty="0" err="1"/>
+              <a:t>self.assertEqual</a:t>
+            </a:r>
+            <a:r>
+              <a:rPr lang="en-CA" dirty="0"/>
+              <a:t>(</a:t>
+            </a:r>
+            <a:r>
+              <a:rPr lang="en-CA" dirty="0" err="1"/>
+              <a:t>gass_sum</a:t>
+            </a:r>
+            <a:r>
+              <a:rPr lang="en-CA" dirty="0"/>
+              <a:t>(-100), -5050)</a:t>
+            </a:r>
+            <a:endParaRPr lang="en-US" dirty="0"/>
+          </a:p>
+        </p:txBody>
+      </p:sp>
+    </p:spTree>
+    <p:extLst>
+      <p:ext uri="{BB962C8B-B14F-4D97-AF65-F5344CB8AC3E}">
+        <p14:creationId xmlns:p14="http://schemas.microsoft.com/office/powerpoint/2010/main" val="4140406878"/>
+      </p:ext>
+    </p:extLst>
+  </p:cSld>
+  <p:clrMapOvr>
+    <a:masterClrMapping/>
+  </p:clrMapOvr>
+</p:sld>
+</file>
+
+<file path=ppt/slides/slide21.xml><?xml version="1.0" encoding="utf-8"?>
+<p:sld xmlns:a="http://schemas.openxmlformats.org/drawingml/2006/main" xmlns:r="http://schemas.openxmlformats.org/officeDocument/2006/relationships" xmlns:p="http://schemas.openxmlformats.org/presentationml/2006/main">
+  <p:cSld>
+    <p:spTree>
+      <p:nvGrpSpPr>
+        <p:cNvPr id="1" name=""/>
+        <p:cNvGrpSpPr/>
+        <p:nvPr/>
+      </p:nvGrpSpPr>
+      <p:grpSpPr>
+        <a:xfrm>
+          <a:off x="0" y="0"/>
+          <a:ext cx="0" cy="0"/>
+          <a:chOff x="0" y="0"/>
+          <a:chExt cx="0" cy="0"/>
+        </a:xfrm>
+      </p:grpSpPr>
+      <p:sp>
+        <p:nvSpPr>
+          <p:cNvPr id="2" name="Title 1">
+            <a:extLst>
+              <a:ext uri="{FF2B5EF4-FFF2-40B4-BE49-F238E27FC236}">
+                <a16:creationId xmlns:a16="http://schemas.microsoft.com/office/drawing/2014/main" id="{E92EAC40-E78B-564E-8097-E15923D63161}"/>
+              </a:ext>
+            </a:extLst>
+          </p:cNvPr>
+          <p:cNvSpPr>
+            <a:spLocks noGrp="1"/>
+          </p:cNvSpPr>
+          <p:nvPr>
+            <p:ph type="title"/>
+          </p:nvPr>
+        </p:nvSpPr>
+        <p:spPr/>
+        <p:txBody>
+          <a:bodyPr/>
+          <a:lstStyle/>
+          <a:p>
+            <a:r>
+              <a:rPr lang="en-US" dirty="0"/>
+              <a:t>Test suite</a:t>
+            </a:r>
+          </a:p>
+        </p:txBody>
+      </p:sp>
+      <p:sp>
+        <p:nvSpPr>
+          <p:cNvPr id="3" name="Content Placeholder 2">
+            <a:extLst>
+              <a:ext uri="{FF2B5EF4-FFF2-40B4-BE49-F238E27FC236}">
+                <a16:creationId xmlns:a16="http://schemas.microsoft.com/office/drawing/2014/main" id="{3765D448-66CC-0344-96CC-5A3948034A78}"/>
+              </a:ext>
+            </a:extLst>
+          </p:cNvPr>
+          <p:cNvSpPr>
+            <a:spLocks noGrp="1"/>
+          </p:cNvSpPr>
+          <p:nvPr>
+            <p:ph idx="1"/>
+          </p:nvPr>
+        </p:nvSpPr>
+        <p:spPr/>
+        <p:txBody>
+          <a:bodyPr/>
+          <a:lstStyle/>
+          <a:p>
+            <a:r>
+              <a:rPr lang="en-CA" dirty="0"/>
+              <a:t>suite = </a:t>
+            </a:r>
+            <a:r>
+              <a:rPr lang="en-CA" dirty="0" err="1"/>
+              <a:t>unittest.TestSuite</a:t>
+            </a:r>
+            <a:r>
+              <a:rPr lang="en-CA" dirty="0"/>
+              <a:t>()</a:t>
+            </a:r>
+            <a:br>
+              <a:rPr lang="en-CA" dirty="0"/>
+            </a:br>
+            <a:r>
+              <a:rPr lang="en-CA" dirty="0" err="1"/>
+              <a:t>suite.addTest</a:t>
+            </a:r>
+            <a:r>
+              <a:rPr lang="en-CA" dirty="0"/>
+              <a:t>(</a:t>
+            </a:r>
+            <a:r>
+              <a:rPr lang="en-CA" dirty="0" err="1"/>
+              <a:t>TestGaussSum</a:t>
+            </a:r>
+            <a:r>
+              <a:rPr lang="en-CA" dirty="0"/>
+              <a:t>(</a:t>
+            </a:r>
+            <a:r>
+              <a:rPr lang="en-CA" b="1" dirty="0"/>
+              <a:t>'</a:t>
+            </a:r>
+            <a:r>
+              <a:rPr lang="en-CA" b="1" dirty="0" err="1"/>
+              <a:t>test_gass_sum_negative</a:t>
+            </a:r>
+            <a:r>
+              <a:rPr lang="en-CA" b="1" dirty="0"/>
+              <a:t>'</a:t>
+            </a:r>
+            <a:r>
+              <a:rPr lang="en-CA" dirty="0"/>
+              <a:t>))</a:t>
+            </a:r>
+            <a:br>
+              <a:rPr lang="en-CA" dirty="0"/>
+            </a:br>
+            <a:r>
+              <a:rPr lang="en-CA" dirty="0" err="1"/>
+              <a:t>suite.addTest</a:t>
+            </a:r>
+            <a:r>
+              <a:rPr lang="en-CA" dirty="0"/>
+              <a:t>(</a:t>
+            </a:r>
+            <a:r>
+              <a:rPr lang="en-CA" dirty="0" err="1"/>
+              <a:t>TestGaussSum</a:t>
+            </a:r>
+            <a:r>
+              <a:rPr lang="en-CA" dirty="0"/>
+              <a:t>(</a:t>
+            </a:r>
+            <a:r>
+              <a:rPr lang="en-CA" b="1" dirty="0"/>
+              <a:t>'</a:t>
+            </a:r>
+            <a:r>
+              <a:rPr lang="en-CA" b="1" dirty="0" err="1"/>
+              <a:t>test_gass_sum_float</a:t>
+            </a:r>
+            <a:r>
+              <a:rPr lang="en-CA" b="1"/>
+              <a:t>'</a:t>
+            </a:r>
+            <a:r>
+              <a:rPr lang="en-CA"/>
+              <a:t>))</a:t>
+            </a:r>
+            <a:br>
+              <a:rPr lang="en-CA"/>
+            </a:br>
+            <a:r>
+              <a:rPr lang="en-CA" b="1"/>
+              <a:t>return </a:t>
+            </a:r>
+            <a:r>
+              <a:rPr lang="en-CA"/>
+              <a:t>suite</a:t>
+            </a:r>
+            <a:br>
+              <a:rPr lang="en-CA"/>
+            </a:br>
+            <a:endParaRPr lang="en-US"/>
+          </a:p>
+        </p:txBody>
+      </p:sp>
+    </p:spTree>
+    <p:extLst>
+      <p:ext uri="{BB962C8B-B14F-4D97-AF65-F5344CB8AC3E}">
+        <p14:creationId xmlns:p14="http://schemas.microsoft.com/office/powerpoint/2010/main" val="335493735"/>
+      </p:ext>
+    </p:extLst>
+  </p:cSld>
+  <p:clrMapOvr>
+    <a:masterClrMapping/>
+  </p:clrMapOvr>
+</p:sld>
+</file>
+
+<file path=ppt/slides/slide22.xml><?xml version="1.0" encoding="utf-8"?>
+<p:sld xmlns:a="http://schemas.openxmlformats.org/drawingml/2006/main" xmlns:r="http://schemas.openxmlformats.org/officeDocument/2006/relationships" xmlns:p="http://schemas.openxmlformats.org/presentationml/2006/main">
+  <p:cSld>
+    <p:spTree>
+      <p:nvGrpSpPr>
+        <p:cNvPr id="1" name=""/>
+        <p:cNvGrpSpPr/>
+        <p:nvPr/>
+      </p:nvGrpSpPr>
+      <p:grpSpPr>
+        <a:xfrm>
+          <a:off x="0" y="0"/>
+          <a:ext cx="0" cy="0"/>
+          <a:chOff x="0" y="0"/>
+          <a:chExt cx="0" cy="0"/>
+        </a:xfrm>
+      </p:grpSpPr>
+      <p:sp>
+        <p:nvSpPr>
+          <p:cNvPr id="2" name="Title 1">
+            <a:extLst>
+              <a:ext uri="{FF2B5EF4-FFF2-40B4-BE49-F238E27FC236}">
+                <a16:creationId xmlns:a16="http://schemas.microsoft.com/office/drawing/2014/main" id="{9CF049F6-F588-2943-ADCF-6240137E859F}"/>
+              </a:ext>
+            </a:extLst>
+          </p:cNvPr>
+          <p:cNvSpPr>
+            <a:spLocks noGrp="1"/>
+          </p:cNvSpPr>
+          <p:nvPr>
+            <p:ph type="title"/>
+          </p:nvPr>
+        </p:nvSpPr>
+        <p:spPr/>
+        <p:txBody>
+          <a:bodyPr/>
+          <a:lstStyle/>
+          <a:p>
+            <a:r>
+              <a:rPr lang="en-US" dirty="0"/>
+              <a:t>Command line </a:t>
+            </a:r>
+          </a:p>
+        </p:txBody>
+      </p:sp>
+      <p:sp>
+        <p:nvSpPr>
+          <p:cNvPr id="3" name="Content Placeholder 2">
+            <a:extLst>
+              <a:ext uri="{FF2B5EF4-FFF2-40B4-BE49-F238E27FC236}">
+                <a16:creationId xmlns:a16="http://schemas.microsoft.com/office/drawing/2014/main" id="{424979FD-121A-DF42-98B6-DF1BE340B516}"/>
+              </a:ext>
+            </a:extLst>
+          </p:cNvPr>
+          <p:cNvSpPr>
+            <a:spLocks noGrp="1"/>
+          </p:cNvSpPr>
+          <p:nvPr>
+            <p:ph idx="1"/>
+          </p:nvPr>
+        </p:nvSpPr>
+        <p:spPr/>
+        <p:txBody>
+          <a:bodyPr/>
+          <a:lstStyle/>
+          <a:p>
+            <a:r>
+              <a:rPr lang="en-CA" dirty="0"/>
+              <a:t>python -m </a:t>
+            </a:r>
+            <a:r>
+              <a:rPr lang="en-CA" dirty="0" err="1"/>
+              <a:t>unittest</a:t>
+            </a:r>
+            <a:r>
+              <a:rPr lang="en-CA" dirty="0"/>
+              <a:t> test_module1 test_module2</a:t>
+            </a:r>
+          </a:p>
+          <a:p>
+            <a:r>
+              <a:rPr lang="en-CA" dirty="0"/>
+              <a:t>python -m </a:t>
+            </a:r>
+            <a:r>
+              <a:rPr lang="en-CA" dirty="0" err="1"/>
+              <a:t>unittest</a:t>
+            </a:r>
+            <a:r>
+              <a:rPr lang="en-CA" dirty="0"/>
+              <a:t> </a:t>
+            </a:r>
+            <a:r>
+              <a:rPr lang="en-CA" dirty="0" err="1"/>
+              <a:t>test_module.TestClass</a:t>
+            </a:r>
+            <a:r>
+              <a:rPr lang="en-CA" dirty="0"/>
+              <a:t> </a:t>
+            </a:r>
+          </a:p>
+          <a:p>
+            <a:r>
+              <a:rPr lang="en-CA" dirty="0"/>
+              <a:t>python -m </a:t>
+            </a:r>
+            <a:r>
+              <a:rPr lang="en-CA" dirty="0" err="1"/>
+              <a:t>unittest</a:t>
+            </a:r>
+            <a:r>
+              <a:rPr lang="en-CA" dirty="0"/>
+              <a:t> </a:t>
+            </a:r>
+            <a:r>
+              <a:rPr lang="en-CA" dirty="0" err="1"/>
+              <a:t>test_module</a:t>
+            </a:r>
+            <a:r>
+              <a:rPr lang="en-CA" dirty="0"/>
+              <a:t>.. </a:t>
+            </a:r>
+            <a:r>
+              <a:rPr lang="en-CA" dirty="0" err="1"/>
+              <a:t>TestClasstest</a:t>
+            </a:r>
+            <a:endParaRPr lang="en-US" dirty="0"/>
+          </a:p>
+        </p:txBody>
+      </p:sp>
+    </p:spTree>
+    <p:extLst>
+      <p:ext uri="{BB962C8B-B14F-4D97-AF65-F5344CB8AC3E}">
+        <p14:creationId xmlns:p14="http://schemas.microsoft.com/office/powerpoint/2010/main" val="913722207"/>
       </p:ext>
     </p:extLst>
   </p:cSld>
@@ -13007,7 +14448,7 @@
             <p:ph idx="1"/>
             <p:extLst>
               <p:ext uri="{D42A27DB-BD31-4B8C-83A1-F6EECF244321}">
-                <p14:modId xmlns:p14="http://schemas.microsoft.com/office/powerpoint/2010/main" val="2572079403"/>
+                <p14:modId xmlns:p14="http://schemas.microsoft.com/office/powerpoint/2010/main" val="1273740534"/>
               </p:ext>
             </p:extLst>
           </p:nvPr>
@@ -13143,7 +14584,7 @@
                     <a:p>
                       <a:r>
                         <a:rPr lang="en-US" dirty="0" err="1"/>
-                        <a:t>Var</a:t>
+                        <a:t>var</a:t>
                       </a:r>
                       <a:r>
                         <a:rPr lang="en-US" baseline="0" dirty="0"/>
@@ -13153,11 +14594,7 @@
                     <a:p>
                       <a:r>
                         <a:rPr lang="en-US" baseline="0" dirty="0"/>
-                        <a:t>w</a:t>
-                      </a:r>
-                      <a:r>
-                        <a:rPr lang="en-US" baseline="0"/>
-                        <a:t>hile </a:t>
+                        <a:t>while </a:t>
                       </a:r>
                       <a:r>
                         <a:rPr lang="en-US" baseline="0" dirty="0" err="1"/>
@@ -14117,16 +15554,12 @@
               <a:buNone/>
             </a:pPr>
             <a:r>
-              <a:rPr lang="en-US" altLang="zh-CN" dirty="0" err="1"/>
+              <a:rPr lang="en-US" altLang="zh-CN" dirty="0"/>
               <a:t>d</a:t>
             </a:r>
             <a:r>
-              <a:rPr lang="en-US" dirty="0" err="1"/>
-              <a:t>ef</a:t>
-            </a:r>
-            <a:r>
               <a:rPr lang="en-US" dirty="0"/>
-              <a:t> </a:t>
+              <a:t>ef </a:t>
             </a:r>
             <a:r>
               <a:rPr lang="en-US" dirty="0" err="1"/>

</xml_diff>

<commit_message>
Add student unit test
</commit_message>
<xml_diff>
--- a/document/course2-3.pptx
+++ b/document/course2-3.pptx
@@ -237,7 +237,7 @@
           <a:p>
             <a:fld id="{90C9A26C-E32A-0842-B5B6-EF949C454305}" type="datetimeFigureOut">
               <a:rPr lang="en-US" smtClean="0"/>
-              <a:t>4/20/19</a:t>
+              <a:t>5/11/19</a:t>
             </a:fld>
             <a:endParaRPr lang="en-US"/>
           </a:p>
@@ -692,7 +692,7 @@
           <a:p>
             <a:fld id="{48A87A34-81AB-432B-8DAE-1953F412C126}" type="datetimeFigureOut">
               <a:rPr lang="en-US" smtClean="0"/>
-              <a:t>4/20/19</a:t>
+              <a:t>5/11/19</a:t>
             </a:fld>
             <a:endParaRPr lang="en-US" dirty="0"/>
           </a:p>
@@ -1026,7 +1026,7 @@
             <a:fld id="{48A87A34-81AB-432B-8DAE-1953F412C126}" type="datetimeFigureOut">
               <a:rPr lang="en-US" smtClean="0"/>
               <a:pPr/>
-              <a:t>4/20/19</a:t>
+              <a:t>5/11/19</a:t>
             </a:fld>
             <a:endParaRPr lang="en-US" dirty="0"/>
           </a:p>
@@ -1424,7 +1424,7 @@
             <a:fld id="{48A87A34-81AB-432B-8DAE-1953F412C126}" type="datetimeFigureOut">
               <a:rPr lang="en-US" smtClean="0"/>
               <a:pPr/>
-              <a:t>4/20/19</a:t>
+              <a:t>5/11/19</a:t>
             </a:fld>
             <a:endParaRPr lang="en-US" dirty="0"/>
           </a:p>
@@ -1757,7 +1757,7 @@
             <a:fld id="{48A87A34-81AB-432B-8DAE-1953F412C126}" type="datetimeFigureOut">
               <a:rPr lang="en-US" smtClean="0"/>
               <a:pPr/>
-              <a:t>4/20/19</a:t>
+              <a:t>5/11/19</a:t>
             </a:fld>
             <a:endParaRPr lang="en-US" dirty="0"/>
           </a:p>
@@ -2074,7 +2074,7 @@
             <a:fld id="{48A87A34-81AB-432B-8DAE-1953F412C126}" type="datetimeFigureOut">
               <a:rPr lang="en-US" smtClean="0"/>
               <a:pPr/>
-              <a:t>4/20/19</a:t>
+              <a:t>5/11/19</a:t>
             </a:fld>
             <a:endParaRPr lang="en-US" dirty="0"/>
           </a:p>
@@ -2467,7 +2467,7 @@
             <a:fld id="{48A87A34-81AB-432B-8DAE-1953F412C126}" type="datetimeFigureOut">
               <a:rPr lang="en-US" smtClean="0"/>
               <a:pPr/>
-              <a:t>4/20/19</a:t>
+              <a:t>5/11/19</a:t>
             </a:fld>
             <a:endParaRPr lang="en-US" dirty="0"/>
           </a:p>
@@ -2720,7 +2720,7 @@
           <a:p>
             <a:fld id="{48A87A34-81AB-432B-8DAE-1953F412C126}" type="datetimeFigureOut">
               <a:rPr lang="en-US" smtClean="0"/>
-              <a:t>4/20/19</a:t>
+              <a:t>5/11/19</a:t>
             </a:fld>
             <a:endParaRPr lang="en-US" dirty="0"/>
           </a:p>
@@ -2977,7 +2977,7 @@
           <a:p>
             <a:fld id="{48A87A34-81AB-432B-8DAE-1953F412C126}" type="datetimeFigureOut">
               <a:rPr lang="en-US" smtClean="0"/>
-              <a:t>4/20/19</a:t>
+              <a:t>5/11/19</a:t>
             </a:fld>
             <a:endParaRPr lang="en-US" dirty="0"/>
           </a:p>
@@ -3234,7 +3234,7 @@
           <a:p>
             <a:fld id="{48A87A34-81AB-432B-8DAE-1953F412C126}" type="datetimeFigureOut">
               <a:rPr lang="en-US" smtClean="0"/>
-              <a:t>4/20/19</a:t>
+              <a:t>5/11/19</a:t>
             </a:fld>
             <a:endParaRPr lang="en-US" dirty="0"/>
           </a:p>
@@ -3558,7 +3558,7 @@
           <a:p>
             <a:fld id="{48A87A34-81AB-432B-8DAE-1953F412C126}" type="datetimeFigureOut">
               <a:rPr lang="en-US" smtClean="0"/>
-              <a:t>4/20/19</a:t>
+              <a:t>5/11/19</a:t>
             </a:fld>
             <a:endParaRPr lang="en-US" dirty="0"/>
           </a:p>
@@ -3876,7 +3876,7 @@
           <a:p>
             <a:fld id="{48A87A34-81AB-432B-8DAE-1953F412C126}" type="datetimeFigureOut">
               <a:rPr lang="en-US" smtClean="0"/>
-              <a:t>4/20/19</a:t>
+              <a:t>5/11/19</a:t>
             </a:fld>
             <a:endParaRPr lang="en-US" dirty="0"/>
           </a:p>
@@ -4328,7 +4328,7 @@
           <a:p>
             <a:fld id="{48A87A34-81AB-432B-8DAE-1953F412C126}" type="datetimeFigureOut">
               <a:rPr lang="en-US" smtClean="0"/>
-              <a:t>4/20/19</a:t>
+              <a:t>5/11/19</a:t>
             </a:fld>
             <a:endParaRPr lang="en-US" dirty="0"/>
           </a:p>
@@ -4528,7 +4528,7 @@
           <a:p>
             <a:fld id="{48A87A34-81AB-432B-8DAE-1953F412C126}" type="datetimeFigureOut">
               <a:rPr lang="en-US" smtClean="0"/>
-              <a:t>4/20/19</a:t>
+              <a:t>5/11/19</a:t>
             </a:fld>
             <a:endParaRPr lang="en-US" dirty="0"/>
           </a:p>
@@ -4700,7 +4700,7 @@
           <a:p>
             <a:fld id="{48A87A34-81AB-432B-8DAE-1953F412C126}" type="datetimeFigureOut">
               <a:rPr lang="en-US" smtClean="0"/>
-              <a:t>4/20/19</a:t>
+              <a:t>5/11/19</a:t>
             </a:fld>
             <a:endParaRPr lang="en-US" dirty="0"/>
           </a:p>
@@ -5028,7 +5028,7 @@
           <a:p>
             <a:fld id="{48A87A34-81AB-432B-8DAE-1953F412C126}" type="datetimeFigureOut">
               <a:rPr lang="en-US" smtClean="0"/>
-              <a:t>4/20/19</a:t>
+              <a:t>5/11/19</a:t>
             </a:fld>
             <a:endParaRPr lang="en-US" dirty="0"/>
           </a:p>
@@ -5368,7 +5368,7 @@
           <a:p>
             <a:fld id="{48A87A34-81AB-432B-8DAE-1953F412C126}" type="datetimeFigureOut">
               <a:rPr lang="en-US" smtClean="0"/>
-              <a:t>4/20/19</a:t>
+              <a:t>5/11/19</a:t>
             </a:fld>
             <a:endParaRPr lang="en-US" dirty="0"/>
           </a:p>
@@ -7481,7 +7481,7 @@
             <a:fld id="{48A87A34-81AB-432B-8DAE-1953F412C126}" type="datetimeFigureOut">
               <a:rPr lang="en-US" smtClean="0"/>
               <a:pPr/>
-              <a:t>4/20/19</a:t>
+              <a:t>5/11/19</a:t>
             </a:fld>
             <a:endParaRPr lang="en-US" dirty="0"/>
           </a:p>
@@ -9593,7 +9593,7 @@
         </p:spPr>
         <p:txBody>
           <a:bodyPr>
-            <a:normAutofit fontScale="62500" lnSpcReduction="20000"/>
+            <a:noAutofit/>
           </a:bodyPr>
           <a:lstStyle/>
           <a:p>
@@ -9601,7 +9601,7 @@
               <a:buNone/>
             </a:pPr>
             <a:r>
-              <a:rPr lang="en-US" dirty="0"/>
+              <a:rPr lang="en-US" sz="1400" dirty="0"/>
               <a:t>class Person:</a:t>
             </a:r>
           </a:p>
@@ -9610,7 +9610,7 @@
               <a:buNone/>
             </a:pPr>
             <a:r>
-              <a:rPr lang="en-US" dirty="0"/>
+              <a:rPr lang="en-US" sz="1400" dirty="0"/>
               <a:t>    __name= ""</a:t>
             </a:r>
           </a:p>
@@ -9619,7 +9619,7 @@
               <a:buNone/>
             </a:pPr>
             <a:r>
-              <a:rPr lang="en-US" dirty="0"/>
+              <a:rPr lang="en-US" sz="1400" dirty="0"/>
               <a:t>    __age =0</a:t>
             </a:r>
           </a:p>
@@ -9627,30 +9627,30 @@
             <a:pPr marL="0" indent="0">
               <a:buNone/>
             </a:pPr>
-            <a:endParaRPr lang="en-US" dirty="0"/>
+            <a:endParaRPr lang="en-US" sz="1400" dirty="0"/>
           </a:p>
           <a:p>
             <a:pPr marL="0" indent="0">
               <a:buNone/>
             </a:pPr>
             <a:r>
-              <a:rPr lang="en-US" dirty="0"/>
+              <a:rPr lang="en-US" sz="1400" dirty="0"/>
               <a:t>    </a:t>
             </a:r>
             <a:r>
-              <a:rPr lang="en-US" dirty="0" err="1"/>
+              <a:rPr lang="en-US" sz="1400" dirty="0" err="1"/>
               <a:t>def</a:t>
             </a:r>
             <a:r>
-              <a:rPr lang="en-US" dirty="0"/>
+              <a:rPr lang="en-US" sz="1400" dirty="0"/>
               <a:t> __</a:t>
             </a:r>
             <a:r>
-              <a:rPr lang="en-US" dirty="0" err="1"/>
+              <a:rPr lang="en-US" sz="1400" dirty="0" err="1"/>
               <a:t>init</a:t>
             </a:r>
             <a:r>
-              <a:rPr lang="en-US" dirty="0"/>
+              <a:rPr lang="en-US" sz="1400" dirty="0"/>
               <a:t>__(self, name):</a:t>
             </a:r>
           </a:p>
@@ -9659,15 +9659,15 @@
               <a:buNone/>
             </a:pPr>
             <a:r>
-              <a:rPr lang="en-US" dirty="0"/>
+              <a:rPr lang="en-US" sz="1400" dirty="0"/>
               <a:t>        </a:t>
             </a:r>
             <a:r>
-              <a:rPr lang="en-US" dirty="0" err="1"/>
+              <a:rPr lang="en-US" sz="1400" dirty="0" err="1"/>
               <a:t>self.__name</a:t>
             </a:r>
             <a:r>
-              <a:rPr lang="en-US" dirty="0"/>
+              <a:rPr lang="en-US" sz="1400" dirty="0"/>
               <a:t> = name</a:t>
             </a:r>
           </a:p>
@@ -9675,30 +9675,30 @@
             <a:pPr marL="0" indent="0">
               <a:buNone/>
             </a:pPr>
-            <a:endParaRPr lang="en-US" dirty="0"/>
+            <a:endParaRPr lang="en-US" sz="1400" dirty="0"/>
           </a:p>
           <a:p>
             <a:pPr marL="0" indent="0">
               <a:buNone/>
             </a:pPr>
             <a:r>
-              <a:rPr lang="en-US" dirty="0"/>
+              <a:rPr lang="en-US" sz="1400" dirty="0"/>
               <a:t>    </a:t>
             </a:r>
             <a:r>
-              <a:rPr lang="en-US" dirty="0" err="1"/>
+              <a:rPr lang="en-US" sz="1400" dirty="0" err="1"/>
               <a:t>def</a:t>
             </a:r>
             <a:r>
-              <a:rPr lang="en-US" dirty="0"/>
+              <a:rPr lang="en-US" sz="1400" dirty="0"/>
               <a:t> </a:t>
             </a:r>
             <a:r>
-              <a:rPr lang="en-US" dirty="0" err="1"/>
+              <a:rPr lang="en-US" sz="1400" dirty="0" err="1"/>
               <a:t>getName</a:t>
             </a:r>
             <a:r>
-              <a:rPr lang="en-US" dirty="0"/>
+              <a:rPr lang="en-US" sz="1400" dirty="0"/>
               <a:t>(self):</a:t>
             </a:r>
           </a:p>
@@ -9707,69 +9707,53 @@
               <a:buNone/>
             </a:pPr>
             <a:r>
-              <a:rPr lang="en-US" dirty="0"/>
+              <a:rPr lang="en-US" sz="1400" dirty="0"/>
               <a:t>        return </a:t>
             </a:r>
             <a:r>
-              <a:rPr lang="en-US" dirty="0" err="1"/>
+              <a:rPr lang="en-US" sz="1400" dirty="0" err="1"/>
               <a:t>self.__name</a:t>
             </a:r>
-            <a:endParaRPr lang="en-US" dirty="0"/>
+            <a:endParaRPr lang="en-US" sz="1400" dirty="0"/>
           </a:p>
           <a:p>
             <a:pPr marL="0" indent="0">
               <a:buNone/>
             </a:pPr>
             <a:r>
-              <a:rPr lang="en-US"/>
-              <a:t>  </a:t>
-            </a:r>
-            <a:endParaRPr lang="en-US" dirty="0"/>
+              <a:rPr lang="en-US" sz="1400" dirty="0"/>
+              <a:t>    </a:t>
+            </a:r>
+            <a:r>
+              <a:rPr lang="en-US" sz="1400" dirty="0" err="1"/>
+              <a:t>def</a:t>
+            </a:r>
+            <a:r>
+              <a:rPr lang="en-US" sz="1400" dirty="0"/>
+              <a:t> __</a:t>
+            </a:r>
+            <a:r>
+              <a:rPr lang="en-US" sz="1400" dirty="0" err="1"/>
+              <a:t>str</a:t>
+            </a:r>
+            <a:r>
+              <a:rPr lang="en-US" sz="1400" dirty="0"/>
+              <a:t>__(self):</a:t>
+            </a:r>
           </a:p>
           <a:p>
             <a:pPr marL="0" indent="0">
               <a:buNone/>
             </a:pPr>
             <a:r>
-              <a:rPr lang="en-US" dirty="0"/>
-              <a:t>    </a:t>
-            </a:r>
-            <a:r>
-              <a:rPr lang="en-US" dirty="0" err="1"/>
-              <a:t>def</a:t>
-            </a:r>
-            <a:r>
-              <a:rPr lang="en-US" dirty="0"/>
-              <a:t> __</a:t>
-            </a:r>
-            <a:r>
-              <a:rPr lang="en-US" dirty="0" err="1"/>
-              <a:t>str</a:t>
-            </a:r>
-            <a:r>
-              <a:rPr lang="en-US" dirty="0"/>
-              <a:t>__(self):</a:t>
-            </a:r>
-          </a:p>
-          <a:p>
-            <a:pPr marL="0" indent="0">
-              <a:buNone/>
-            </a:pPr>
-            <a:r>
-              <a:rPr lang="en-US" dirty="0"/>
+              <a:rPr lang="en-US" sz="1400" dirty="0"/>
               <a:t>        return "name: %</a:t>
             </a:r>
             <a:r>
-              <a:rPr lang="en-US" dirty="0" err="1"/>
+              <a:rPr lang="en-US" sz="1400" dirty="0" err="1"/>
               <a:t>s"%self.__name</a:t>
             </a:r>
-            <a:endParaRPr lang="en-US" dirty="0"/>
-          </a:p>
-          <a:p>
-            <a:pPr marL="0" indent="0">
-              <a:buNone/>
-            </a:pPr>
-            <a:endParaRPr lang="en-US" dirty="0"/>
+            <a:endParaRPr lang="en-US" sz="1400" dirty="0"/>
           </a:p>
           <a:p>
             <a:pPr>
@@ -9777,23 +9761,23 @@
               <a:buChar char="•"/>
             </a:pPr>
             <a:r>
-              <a:rPr lang="en-US" dirty="0"/>
+              <a:rPr lang="en-US" sz="1400" dirty="0"/>
               <a:t>The first method </a:t>
             </a:r>
             <a:r>
-              <a:rPr lang="en-US" i="1" dirty="0"/>
+              <a:rPr lang="en-US" sz="1400" i="1" dirty="0"/>
               <a:t>__</a:t>
             </a:r>
             <a:r>
-              <a:rPr lang="en-US" i="1" dirty="0" err="1"/>
+              <a:rPr lang="en-US" sz="1400" i="1" dirty="0" err="1"/>
               <a:t>init</a:t>
             </a:r>
             <a:r>
-              <a:rPr lang="en-US" i="1" dirty="0"/>
+              <a:rPr lang="en-US" sz="1400" i="1" dirty="0"/>
               <a:t>__()</a:t>
             </a:r>
             <a:r>
-              <a:rPr lang="en-US" dirty="0"/>
+              <a:rPr lang="en-US" sz="1400" dirty="0"/>
               <a:t> is a special method, which is called class constructor or initialization method that Python calls when you create a new instance of this class.</a:t>
             </a:r>
           </a:p>
@@ -9803,15 +9787,15 @@
               <a:buChar char="•"/>
             </a:pPr>
             <a:r>
-              <a:rPr lang="en-US" dirty="0"/>
+              <a:rPr lang="en-US" sz="1400" dirty="0"/>
               <a:t> Python adds the </a:t>
             </a:r>
             <a:r>
-              <a:rPr lang="en-US" i="1" dirty="0"/>
+              <a:rPr lang="en-US" sz="1400" i="1" dirty="0"/>
               <a:t>self</a:t>
             </a:r>
             <a:r>
-              <a:rPr lang="en-US" dirty="0"/>
+              <a:rPr lang="en-US" sz="1400" dirty="0"/>
               <a:t> argument to the method; you do not need to include it when you call the methods.</a:t>
             </a:r>
           </a:p>
@@ -12344,7 +12328,7 @@
             <p:ph idx="1"/>
             <p:extLst>
               <p:ext uri="{D42A27DB-BD31-4B8C-83A1-F6EECF244321}">
-                <p14:modId xmlns:p14="http://schemas.microsoft.com/office/powerpoint/2010/main" val="2008601594"/>
+                <p14:modId xmlns:p14="http://schemas.microsoft.com/office/powerpoint/2010/main" val="1274852031"/>
               </p:ext>
             </p:extLst>
           </p:nvPr>
@@ -12676,11 +12660,19 @@
                     <a:p>
                       <a:r>
                         <a:rPr lang="en-US" dirty="0"/>
-                        <a:t>     print</a:t>
+                        <a:t>     </a:t>
+                      </a:r>
+                      <a:r>
+                        <a:rPr lang="en-US" dirty="0" err="1"/>
+                        <a:t>print</a:t>
+                      </a:r>
+                      <a:r>
+                        <a:rPr lang="en-US" baseline="0" dirty="0" err="1"/>
+                        <a:t>“something</a:t>
                       </a:r>
                       <a:r>
                         <a:rPr lang="en-US" baseline="0" dirty="0"/>
-                        <a:t> “something”</a:t>
+                        <a:t>”</a:t>
                       </a:r>
                     </a:p>
                     <a:p>

</xml_diff>